<commit_message>
Präsentation, aber noch nicht wirklich weitergekommen
Werde morgen nochmal drangehen, sorry.
</commit_message>
<xml_diff>
--- a/Hamster Holzer Kleinekort.pptx
+++ b/Hamster Holzer Kleinekort.pptx
@@ -2066,27 +2066,7 @@
                   </a:schemeClr>
                 </a:solidFill>
               </a:rPr>
-              <a:t> </a:t>
-            </a:r>
-            <a:r>
-              <a:rPr lang="de-DE" sz="1000" baseline="0" dirty="0" smtClean="0">
-                <a:solidFill>
-                  <a:schemeClr val="bg1">
-                    <a:lumMod val="50000"/>
-                  </a:schemeClr>
-                </a:solidFill>
-              </a:rPr>
-              <a:t>und Jan Kleinekort, </a:t>
-            </a:r>
-            <a:r>
-              <a:rPr lang="de-DE" sz="1000" baseline="0" dirty="0" smtClean="0">
-                <a:solidFill>
-                  <a:schemeClr val="bg1">
-                    <a:lumMod val="50000"/>
-                  </a:schemeClr>
-                </a:solidFill>
-              </a:rPr>
-              <a:t>04.12.2014</a:t>
+              <a:t> und Jan Kleinekort, 04.12.2014</a:t>
             </a:r>
             <a:endParaRPr lang="de-DE" sz="1000" dirty="0">
               <a:solidFill>
@@ -2568,16 +2548,21 @@
           <a:lstStyle/>
           <a:p>
             <a:r>
+              <a:rPr lang="de-DE" dirty="0" smtClean="0"/>
+              <a:t>Projektarbeit Hamster-Modell </a:t>
+            </a:r>
+            <a:r>
               <a:rPr lang="de-DE" dirty="0"/>
-              <a:t>Ausarbeitung im Rahmen der Vorlesung</a:t>
-            </a:r>
-          </a:p>
-          <a:p>
+              <a:t>im Rahmen der </a:t>
+            </a:r>
             <a:r>
               <a:rPr lang="de-DE" dirty="0" smtClean="0"/>
-              <a:t>Wissensbasierte Systeme</a:t>
-            </a:r>
-            <a:endParaRPr lang="de-DE" dirty="0" smtClean="0"/>
+              <a:t>Vorlesung Wissensbasierte </a:t>
+            </a:r>
+            <a:r>
+              <a:rPr lang="de-DE" dirty="0" smtClean="0"/>
+              <a:t>Systeme</a:t>
+            </a:r>
           </a:p>
           <a:p>
             <a:pPr>
@@ -2623,7 +2608,6 @@
               <a:rPr lang="de-DE" sz="2000" dirty="0" smtClean="0"/>
               <a:t>Kai Holzer</a:t>
             </a:r>
-            <a:endParaRPr lang="de-DE" sz="2000" dirty="0" smtClean="0"/>
           </a:p>
           <a:p>
             <a:pPr>
@@ -2716,8 +2700,15 @@
           <a:p>
             <a:r>
               <a:rPr lang="de-DE" dirty="0" smtClean="0"/>
-              <a:t>Wie haben wir die Aufgabenstellung gelöst?</a:t>
-            </a:r>
+              <a:t>Lösungsansätze</a:t>
+            </a:r>
+          </a:p>
+          <a:p>
+            <a:r>
+              <a:rPr lang="de-DE" dirty="0" smtClean="0"/>
+              <a:t>Unser Weg zur Lösung</a:t>
+            </a:r>
+            <a:endParaRPr lang="de-DE" dirty="0" smtClean="0"/>
           </a:p>
           <a:p>
             <a:r>
@@ -2914,6 +2905,67 @@
                       </p:childTnLst>
                     </p:cTn>
                   </p:par>
+                  <p:par>
+                    <p:cTn id="13" fill="hold">
+                      <p:stCondLst>
+                        <p:cond delay="indefinite"/>
+                      </p:stCondLst>
+                      <p:childTnLst>
+                        <p:par>
+                          <p:cTn id="14" fill="hold">
+                            <p:stCondLst>
+                              <p:cond delay="0"/>
+                            </p:stCondLst>
+                            <p:childTnLst>
+                              <p:par>
+                                <p:cTn id="15" presetID="10" presetClass="entr" presetSubtype="0" fill="hold" grpId="0" nodeType="clickEffect">
+                                  <p:stCondLst>
+                                    <p:cond delay="0"/>
+                                  </p:stCondLst>
+                                  <p:childTnLst>
+                                    <p:set>
+                                      <p:cBhvr>
+                                        <p:cTn id="16" dur="1" fill="hold">
+                                          <p:stCondLst>
+                                            <p:cond delay="0"/>
+                                          </p:stCondLst>
+                                        </p:cTn>
+                                        <p:tgtEl>
+                                          <p:spTgt spid="3">
+                                            <p:txEl>
+                                              <p:pRg st="2" end="2"/>
+                                            </p:txEl>
+                                          </p:spTgt>
+                                        </p:tgtEl>
+                                        <p:attrNameLst>
+                                          <p:attrName>style.visibility</p:attrName>
+                                        </p:attrNameLst>
+                                      </p:cBhvr>
+                                      <p:to>
+                                        <p:strVal val="visible"/>
+                                      </p:to>
+                                    </p:set>
+                                    <p:animEffect transition="in" filter="fade">
+                                      <p:cBhvr>
+                                        <p:cTn id="17" dur="500"/>
+                                        <p:tgtEl>
+                                          <p:spTgt spid="3">
+                                            <p:txEl>
+                                              <p:pRg st="2" end="2"/>
+                                            </p:txEl>
+                                          </p:spTgt>
+                                        </p:tgtEl>
+                                      </p:cBhvr>
+                                    </p:animEffect>
+                                  </p:childTnLst>
+                                </p:cTn>
+                              </p:par>
+                            </p:childTnLst>
+                          </p:cTn>
+                        </p:par>
+                      </p:childTnLst>
+                    </p:cTn>
+                  </p:par>
                 </p:childTnLst>
               </p:cTn>
               <p:prevCondLst>
@@ -2976,7 +3028,7 @@
           <a:p>
             <a:r>
               <a:rPr lang="de-DE" dirty="0" smtClean="0"/>
-              <a:t>Lösung der Aufgabenstellung</a:t>
+              <a:t>Lösungsansätze</a:t>
             </a:r>
             <a:endParaRPr lang="de-DE" dirty="0"/>
           </a:p>
@@ -2997,6 +3049,13 @@
           <a:bodyPr/>
           <a:lstStyle/>
           <a:p>
+            <a:endParaRPr lang="de-DE" dirty="0" smtClean="0"/>
+          </a:p>
+          <a:p>
+            <a:r>
+              <a:rPr lang="de-DE" dirty="0" smtClean="0"/>
+              <a:t>Vollständig zufälliger Hamster</a:t>
+            </a:r>
             <a:endParaRPr lang="de-DE" dirty="0"/>
           </a:p>
         </p:txBody>
@@ -3009,8 +3068,8 @@
         </p:nvSpPr>
         <p:spPr>
           <a:xfrm>
-            <a:off x="7347548" y="189832"/>
-            <a:ext cx="1842172" cy="261610"/>
+            <a:off x="8113784" y="189832"/>
+            <a:ext cx="1075936" cy="261610"/>
           </a:xfrm>
           <a:prstGeom prst="rect">
             <a:avLst/>
@@ -3032,7 +3091,7 @@
                   </a:schemeClr>
                 </a:solidFill>
               </a:rPr>
-              <a:t>Lösung der Aufgabenstellung</a:t>
+              <a:t>Lösungsansätze</a:t>
             </a:r>
             <a:endParaRPr lang="de-DE" sz="1100" dirty="0">
               <a:solidFill>
@@ -3075,15 +3134,10 @@
                             </p:stCondLst>
                             <p:childTnLst>
                               <p:par>
-                                <p:cTn id="5" presetID="10" presetClass="entr" presetSubtype="0" fill="hold" grpId="0" nodeType="clickEffect" nodePh="1">
+                                <p:cTn id="5" presetID="10" presetClass="entr" presetSubtype="0" fill="hold" grpId="0" nodeType="clickEffect">
                                   <p:stCondLst>
                                     <p:cond delay="0"/>
                                   </p:stCondLst>
-                                  <p:endCondLst>
-                                    <p:cond evt="begin" delay="0">
-                                      <p:tn val="5"/>
-                                    </p:cond>
-                                  </p:endCondLst>
                                   <p:childTnLst>
                                     <p:set>
                                       <p:cBhvr>
@@ -3095,7 +3149,7 @@
                                         <p:tgtEl>
                                           <p:spTgt spid="3">
                                             <p:txEl>
-                                              <p:pRg st="0" end="0"/>
+                                              <p:pRg st="1" end="1"/>
                                             </p:txEl>
                                           </p:spTgt>
                                         </p:tgtEl>
@@ -3113,7 +3167,7 @@
                                         <p:tgtEl>
                                           <p:spTgt spid="3">
                                             <p:txEl>
-                                              <p:pRg st="0" end="0"/>
+                                              <p:pRg st="1" end="1"/>
                                             </p:txEl>
                                           </p:spTgt>
                                         </p:tgtEl>

</xml_diff>